<commit_message>
Image additions for phone tapping and flicking.
</commit_message>
<xml_diff>
--- a/release/gff/gff_amharic_classic/docs/MultitapsAndFlicks.pptx
+++ b/release/gff/gff_amharic_classic/docs/MultitapsAndFlicks.pptx
@@ -114,6 +114,11 @@
       </a:defRPr>
     </a:lvl9pPr>
   </p:defaultTextStyle>
+  <p:extLst>
+    <p:ext uri="{EFAFB233-063F-42B5-8137-9DF3F51BA10A}">
+      <p15:sldGuideLst xmlns:p15="http://schemas.microsoft.com/office/powerpoint/2012/main"/>
+    </p:ext>
+  </p:extLst>
 </p:presentation>
 </file>
 
@@ -8305,7 +8310,7 @@
         </p:nvSpPr>
         <p:spPr>
           <a:xfrm>
-            <a:off x="6345667" y="1692998"/>
+            <a:off x="6269736" y="1705754"/>
             <a:ext cx="933717" cy="453907"/>
           </a:xfrm>
           <a:prstGeom prst="rect">
@@ -10900,7 +10905,7 @@
             <p:spPr>
               <a:xfrm>
                 <a:off x="6477477" y="2547913"/>
-                <a:ext cx="338554" cy="369332"/>
+                <a:ext cx="344966" cy="369332"/>
               </a:xfrm>
               <a:prstGeom prst="rect">
                 <a:avLst/>
@@ -10919,7 +10924,7 @@
                   <a:rPr lang="en-US">
                     <a:latin typeface="Kefa" panose="02000506000000020004" pitchFamily="2" charset="77"/>
                   </a:rPr>
-                  <a:t>ኅ</a:t>
+                  <a:t>ኀ</a:t>
                 </a:r>
               </a:p>
             </p:txBody>

</xml_diff>